<commit_message>
First Version for SRS documents
</commit_message>
<xml_diff>
--- a/docs/SRS/SystemContextFigure.pptx
+++ b/docs/SRS/SystemContextFigure.pptx
@@ -304,7 +304,7 @@
           <a:p>
             <a:fld id="{779256A2-DE0C-7447-B687-786F38514E8C}" type="datetimeFigureOut">
               <a:rPr lang="en-US" smtClean="0"/>
-              <a:t>9/4/19</a:t>
+              <a:t>2/2/23</a:t>
             </a:fld>
             <a:endParaRPr lang="en-US"/>
           </a:p>
@@ -474,7 +474,7 @@
           <a:p>
             <a:fld id="{779256A2-DE0C-7447-B687-786F38514E8C}" type="datetimeFigureOut">
               <a:rPr lang="en-US" smtClean="0"/>
-              <a:t>9/4/19</a:t>
+              <a:t>2/2/23</a:t>
             </a:fld>
             <a:endParaRPr lang="en-US"/>
           </a:p>
@@ -654,7 +654,7 @@
           <a:p>
             <a:fld id="{779256A2-DE0C-7447-B687-786F38514E8C}" type="datetimeFigureOut">
               <a:rPr lang="en-US" smtClean="0"/>
-              <a:t>9/4/19</a:t>
+              <a:t>2/2/23</a:t>
             </a:fld>
             <a:endParaRPr lang="en-US"/>
           </a:p>
@@ -824,7 +824,7 @@
           <a:p>
             <a:fld id="{779256A2-DE0C-7447-B687-786F38514E8C}" type="datetimeFigureOut">
               <a:rPr lang="en-US" smtClean="0"/>
-              <a:t>9/4/19</a:t>
+              <a:t>2/2/23</a:t>
             </a:fld>
             <a:endParaRPr lang="en-US"/>
           </a:p>
@@ -1070,7 +1070,7 @@
           <a:p>
             <a:fld id="{779256A2-DE0C-7447-B687-786F38514E8C}" type="datetimeFigureOut">
               <a:rPr lang="en-US" smtClean="0"/>
-              <a:t>9/4/19</a:t>
+              <a:t>2/2/23</a:t>
             </a:fld>
             <a:endParaRPr lang="en-US"/>
           </a:p>
@@ -1358,7 +1358,7 @@
           <a:p>
             <a:fld id="{779256A2-DE0C-7447-B687-786F38514E8C}" type="datetimeFigureOut">
               <a:rPr lang="en-US" smtClean="0"/>
-              <a:t>9/4/19</a:t>
+              <a:t>2/2/23</a:t>
             </a:fld>
             <a:endParaRPr lang="en-US"/>
           </a:p>
@@ -1780,7 +1780,7 @@
           <a:p>
             <a:fld id="{779256A2-DE0C-7447-B687-786F38514E8C}" type="datetimeFigureOut">
               <a:rPr lang="en-US" smtClean="0"/>
-              <a:t>9/4/19</a:t>
+              <a:t>2/2/23</a:t>
             </a:fld>
             <a:endParaRPr lang="en-US"/>
           </a:p>
@@ -1898,7 +1898,7 @@
           <a:p>
             <a:fld id="{779256A2-DE0C-7447-B687-786F38514E8C}" type="datetimeFigureOut">
               <a:rPr lang="en-US" smtClean="0"/>
-              <a:t>9/4/19</a:t>
+              <a:t>2/2/23</a:t>
             </a:fld>
             <a:endParaRPr lang="en-US"/>
           </a:p>
@@ -1993,7 +1993,7 @@
           <a:p>
             <a:fld id="{779256A2-DE0C-7447-B687-786F38514E8C}" type="datetimeFigureOut">
               <a:rPr lang="en-US" smtClean="0"/>
-              <a:t>9/4/19</a:t>
+              <a:t>2/2/23</a:t>
             </a:fld>
             <a:endParaRPr lang="en-US"/>
           </a:p>
@@ -2270,7 +2270,7 @@
           <a:p>
             <a:fld id="{779256A2-DE0C-7447-B687-786F38514E8C}" type="datetimeFigureOut">
               <a:rPr lang="en-US" smtClean="0"/>
-              <a:t>9/4/19</a:t>
+              <a:t>2/2/23</a:t>
             </a:fld>
             <a:endParaRPr lang="en-US"/>
           </a:p>
@@ -2523,7 +2523,7 @@
           <a:p>
             <a:fld id="{779256A2-DE0C-7447-B687-786F38514E8C}" type="datetimeFigureOut">
               <a:rPr lang="en-US" smtClean="0"/>
-              <a:t>9/4/19</a:t>
+              <a:t>2/2/23</a:t>
             </a:fld>
             <a:endParaRPr lang="en-US"/>
           </a:p>
@@ -2736,7 +2736,7 @@
           <a:p>
             <a:fld id="{779256A2-DE0C-7447-B687-786F38514E8C}" type="datetimeFigureOut">
               <a:rPr lang="en-US" smtClean="0"/>
-              <a:t>9/4/19</a:t>
+              <a:t>2/2/23</a:t>
             </a:fld>
             <a:endParaRPr lang="en-US"/>
           </a:p>
@@ -3194,7 +3194,10 @@
                 <a:lstStyle/>
                 <a:p>
                   <a:pPr algn="ctr"/>
-                  <a:endParaRPr lang="en-US"/>
+                  <a:endParaRPr lang="en-US">
+                    <a:latin typeface="Calibri" panose="020F0502020204030204" pitchFamily="34" charset="0"/>
+                    <a:cs typeface="Calibri" panose="020F0502020204030204" pitchFamily="34" charset="0"/>
+                  </a:endParaRPr>
                 </a:p>
               </p:txBody>
             </p:sp>
@@ -3222,8 +3225,8 @@
                 <a:p>
                   <a:r>
                     <a:rPr lang="en-US" sz="2400" dirty="0">
-                      <a:latin typeface="Times New Roman"/>
-                      <a:cs typeface="Times New Roman"/>
+                      <a:latin typeface="Calibri" panose="020F0502020204030204" pitchFamily="34" charset="0"/>
+                      <a:cs typeface="Calibri" panose="020F0502020204030204" pitchFamily="34" charset="0"/>
                     </a:rPr>
                     <a:t>User</a:t>
                   </a:r>
@@ -3286,7 +3289,10 @@
                 <a:lstStyle/>
                 <a:p>
                   <a:pPr algn="ctr"/>
-                  <a:endParaRPr lang="en-US"/>
+                  <a:endParaRPr lang="en-US">
+                    <a:latin typeface="Calibri" panose="020F0502020204030204" pitchFamily="34" charset="0"/>
+                    <a:cs typeface="Calibri" panose="020F0502020204030204" pitchFamily="34" charset="0"/>
+                  </a:endParaRPr>
                 </a:p>
               </p:txBody>
             </p:sp>
@@ -3314,8 +3320,8 @@
                 <a:p>
                   <a:r>
                     <a:rPr lang="en-US" sz="2400" dirty="0">
-                      <a:latin typeface="Times New Roman"/>
-                      <a:cs typeface="Times New Roman"/>
+                      <a:latin typeface="Calibri" panose="020F0502020204030204" pitchFamily="34" charset="0"/>
+                      <a:cs typeface="Calibri" panose="020F0502020204030204" pitchFamily="34" charset="0"/>
                     </a:rPr>
                     <a:t>User</a:t>
                   </a:r>
@@ -3332,10 +3338,10 @@
           </p:nvGrpSpPr>
           <p:grpSpPr>
             <a:xfrm>
-              <a:off x="3885481" y="3381165"/>
-              <a:ext cx="1523744" cy="1246370"/>
-              <a:chOff x="3703297" y="1721177"/>
-              <a:chExt cx="1523744" cy="1246370"/>
+              <a:off x="3880896" y="3381165"/>
+              <a:ext cx="1625317" cy="1246370"/>
+              <a:chOff x="3698712" y="1721177"/>
+              <a:chExt cx="1625317" cy="1246370"/>
             </a:xfrm>
           </p:grpSpPr>
           <p:sp>
@@ -3346,8 +3352,8 @@
             </p:nvSpPr>
             <p:spPr>
               <a:xfrm>
-                <a:off x="3703297" y="1721177"/>
-                <a:ext cx="1483694" cy="1246370"/>
+                <a:off x="3703296" y="1721177"/>
+                <a:ext cx="1604927" cy="1246370"/>
               </a:xfrm>
               <a:prstGeom prst="rect">
                 <a:avLst/>
@@ -3380,7 +3386,10 @@
               <a:p>
                 <a:pPr algn="ctr"/>
                 <a:r>
-                  <a:rPr lang="en-US"/>
+                  <a:rPr lang="en-US">
+                    <a:latin typeface="Calibri" panose="020F0502020204030204" pitchFamily="34" charset="0"/>
+                    <a:cs typeface="Calibri" panose="020F0502020204030204" pitchFamily="34" charset="0"/>
+                  </a:rPr>
                   <a:t>`</a:t>
                 </a:r>
               </a:p>
@@ -3394,8 +3403,8 @@
             </p:nvSpPr>
             <p:spPr>
               <a:xfrm>
-                <a:off x="3726309" y="2113529"/>
-                <a:ext cx="1500732" cy="461665"/>
+                <a:off x="3698712" y="2144307"/>
+                <a:ext cx="1625317" cy="400110"/>
               </a:xfrm>
               <a:prstGeom prst="rect">
                 <a:avLst/>
@@ -3408,17 +3417,14 @@
               </a:bodyPr>
               <a:lstStyle/>
               <a:p>
+                <a:pPr algn="ctr"/>
                 <a:r>
-                  <a:rPr lang="en-US" sz="2400" dirty="0" err="1">
-                    <a:latin typeface="Times New Roman"/>
-                    <a:cs typeface="Times New Roman"/>
+                  <a:rPr lang="en-US" sz="2000" dirty="0">
+                    <a:latin typeface="Calibri" panose="020F0502020204030204" pitchFamily="34" charset="0"/>
+                    <a:cs typeface="Calibri" panose="020F0502020204030204" pitchFamily="34" charset="0"/>
                   </a:rPr>
-                  <a:t>ProgName</a:t>
+                  <a:t>Demographer</a:t>
                 </a:r>
-                <a:endParaRPr lang="en-US" sz="2400" dirty="0">
-                  <a:latin typeface="Times New Roman"/>
-                  <a:cs typeface="Times New Roman"/>
-                </a:endParaRPr>
               </a:p>
             </p:txBody>
           </p:sp>
@@ -3427,6 +3433,7 @@
           <p:nvCxnSpPr>
             <p:cNvPr id="25" name="Straight Arrow Connector 24"/>
             <p:cNvCxnSpPr>
+              <a:cxnSpLocks/>
               <a:stCxn id="4" idx="6"/>
               <a:endCxn id="18" idx="1"/>
             </p:cNvCxnSpPr>
@@ -3435,44 +3442,7 @@
           <p:spPr>
             <a:xfrm flipV="1">
               <a:off x="1436215" y="4004350"/>
-              <a:ext cx="2449266" cy="6571"/>
-            </a:xfrm>
-            <a:prstGeom prst="straightConnector1">
-              <a:avLst/>
-            </a:prstGeom>
-            <a:ln w="38100" cmpd="sng">
-              <a:solidFill>
-                <a:schemeClr val="tx1"/>
-              </a:solidFill>
-              <a:tailEnd type="arrow"/>
-            </a:ln>
-            <a:effectLst/>
-          </p:spPr>
-          <p:style>
-            <a:lnRef idx="2">
-              <a:schemeClr val="accent1"/>
-            </a:lnRef>
-            <a:fillRef idx="0">
-              <a:schemeClr val="accent1"/>
-            </a:fillRef>
-            <a:effectRef idx="1">
-              <a:schemeClr val="accent1"/>
-            </a:effectRef>
-            <a:fontRef idx="minor">
-              <a:schemeClr val="tx1"/>
-            </a:fontRef>
-          </p:style>
-        </p:cxnSp>
-        <p:cxnSp>
-          <p:nvCxnSpPr>
-            <p:cNvPr id="27" name="Straight Arrow Connector 26"/>
-            <p:cNvCxnSpPr/>
-            <p:nvPr/>
-          </p:nvCxnSpPr>
-          <p:spPr>
-            <a:xfrm>
-              <a:off x="5369175" y="4010921"/>
-              <a:ext cx="2449266" cy="0"/>
+              <a:ext cx="2449265" cy="6571"/>
             </a:xfrm>
             <a:prstGeom prst="straightConnector1">
               <a:avLst/>
@@ -3509,7 +3479,7 @@
           <p:spPr>
             <a:xfrm>
               <a:off x="1745191" y="3577615"/>
-              <a:ext cx="1114408" cy="369332"/>
+              <a:ext cx="184731" cy="369332"/>
             </a:xfrm>
             <a:prstGeom prst="rect">
               <a:avLst/>
@@ -3522,49 +3492,224 @@
             </a:bodyPr>
             <a:lstStyle/>
             <a:p>
-              <a:r>
-                <a:rPr lang="en-US" dirty="0">
-                  <a:latin typeface="Times New Roman"/>
-                  <a:cs typeface="Times New Roman"/>
-                </a:rPr>
-                <a:t>Inputs: …</a:t>
-              </a:r>
-            </a:p>
-          </p:txBody>
-        </p:sp>
-        <p:sp>
-          <p:nvSpPr>
-            <p:cNvPr id="35" name="TextBox 34"/>
-            <p:cNvSpPr txBox="1"/>
-            <p:nvPr/>
-          </p:nvSpPr>
-          <p:spPr>
-            <a:xfrm>
-              <a:off x="5369175" y="3577615"/>
-              <a:ext cx="1268296" cy="369332"/>
-            </a:xfrm>
-            <a:prstGeom prst="rect">
-              <a:avLst/>
-            </a:prstGeom>
-            <a:noFill/>
-          </p:spPr>
-          <p:txBody>
-            <a:bodyPr wrap="none" rtlCol="0">
-              <a:spAutoFit/>
-            </a:bodyPr>
-            <a:lstStyle/>
-            <a:p>
-              <a:r>
-                <a:rPr lang="en-US" dirty="0">
-                  <a:latin typeface="Times New Roman"/>
-                  <a:cs typeface="Times New Roman"/>
-                </a:rPr>
-                <a:t>Outputs: …</a:t>
-              </a:r>
+              <a:endParaRPr lang="en-US" dirty="0">
+                <a:latin typeface="Calibri" panose="020F0502020204030204" pitchFamily="34" charset="0"/>
+                <a:cs typeface="Calibri" panose="020F0502020204030204" pitchFamily="34" charset="0"/>
+              </a:endParaRPr>
             </a:p>
           </p:txBody>
         </p:sp>
       </p:grpSp>
+      <p:sp>
+        <p:nvSpPr>
+          <p:cNvPr id="12" name="TextBox 11">
+            <a:extLst>
+              <a:ext uri="{FF2B5EF4-FFF2-40B4-BE49-F238E27FC236}">
+                <a16:creationId xmlns:a16="http://schemas.microsoft.com/office/drawing/2014/main" id="{283AB098-B125-A12D-F403-223FC1BF5F61}"/>
+              </a:ext>
+            </a:extLst>
+          </p:cNvPr>
+          <p:cNvSpPr txBox="1"/>
+          <p:nvPr/>
+        </p:nvSpPr>
+        <p:spPr>
+          <a:xfrm>
+            <a:off x="1837556" y="3059668"/>
+            <a:ext cx="1371979" cy="369332"/>
+          </a:xfrm>
+          <a:prstGeom prst="rect">
+            <a:avLst/>
+          </a:prstGeom>
+          <a:noFill/>
+        </p:spPr>
+        <p:txBody>
+          <a:bodyPr wrap="none" rtlCol="0">
+            <a:spAutoFit/>
+          </a:bodyPr>
+          <a:lstStyle/>
+          <a:p>
+            <a:r>
+              <a:rPr lang="en-US" dirty="0">
+                <a:latin typeface="Calibri" panose="020F0502020204030204" pitchFamily="34" charset="0"/>
+                <a:cs typeface="Calibri" panose="020F0502020204030204" pitchFamily="34" charset="0"/>
+              </a:rPr>
+              <a:t>Input 1: Year</a:t>
+            </a:r>
+          </a:p>
+        </p:txBody>
+      </p:sp>
+      <p:sp>
+        <p:nvSpPr>
+          <p:cNvPr id="13" name="TextBox 12">
+            <a:extLst>
+              <a:ext uri="{FF2B5EF4-FFF2-40B4-BE49-F238E27FC236}">
+                <a16:creationId xmlns:a16="http://schemas.microsoft.com/office/drawing/2014/main" id="{E6AD9CE3-FD77-666E-17BA-5B0C243E0CDF}"/>
+              </a:ext>
+            </a:extLst>
+          </p:cNvPr>
+          <p:cNvSpPr txBox="1"/>
+          <p:nvPr/>
+        </p:nvSpPr>
+        <p:spPr>
+          <a:xfrm>
+            <a:off x="1642491" y="3572430"/>
+            <a:ext cx="1984518" cy="369332"/>
+          </a:xfrm>
+          <a:prstGeom prst="rect">
+            <a:avLst/>
+          </a:prstGeom>
+          <a:noFill/>
+        </p:spPr>
+        <p:txBody>
+          <a:bodyPr wrap="none" rtlCol="0">
+            <a:spAutoFit/>
+          </a:bodyPr>
+          <a:lstStyle/>
+          <a:p>
+            <a:r>
+              <a:rPr lang="en-US" dirty="0">
+                <a:latin typeface="Calibri" panose="020F0502020204030204" pitchFamily="34" charset="0"/>
+                <a:cs typeface="Calibri" panose="020F0502020204030204" pitchFamily="34" charset="0"/>
+              </a:rPr>
+              <a:t>Input 2: Population</a:t>
+            </a:r>
+          </a:p>
+        </p:txBody>
+      </p:sp>
+      <p:cxnSp>
+        <p:nvCxnSpPr>
+          <p:cNvPr id="14" name="Straight Arrow Connector 13">
+            <a:extLst>
+              <a:ext uri="{FF2B5EF4-FFF2-40B4-BE49-F238E27FC236}">
+                <a16:creationId xmlns:a16="http://schemas.microsoft.com/office/drawing/2014/main" id="{9C6035DB-E002-E289-7146-D37A561A0E29}"/>
+              </a:ext>
+            </a:extLst>
+          </p:cNvPr>
+          <p:cNvCxnSpPr>
+            <a:cxnSpLocks/>
+            <a:stCxn id="18" idx="3"/>
+            <a:endCxn id="8" idx="2"/>
+          </p:cNvCxnSpPr>
+          <p:nvPr/>
+        </p:nvCxnSpPr>
+        <p:spPr>
+          <a:xfrm>
+            <a:off x="5490407" y="3491558"/>
+            <a:ext cx="2311915" cy="6571"/>
+          </a:xfrm>
+          <a:prstGeom prst="straightConnector1">
+            <a:avLst/>
+          </a:prstGeom>
+          <a:ln w="38100" cmpd="sng">
+            <a:solidFill>
+              <a:schemeClr val="tx1"/>
+            </a:solidFill>
+            <a:tailEnd type="arrow"/>
+          </a:ln>
+          <a:effectLst/>
+        </p:spPr>
+        <p:style>
+          <a:lnRef idx="2">
+            <a:schemeClr val="accent1"/>
+          </a:lnRef>
+          <a:fillRef idx="0">
+            <a:schemeClr val="accent1"/>
+          </a:fillRef>
+          <a:effectRef idx="1">
+            <a:schemeClr val="accent1"/>
+          </a:effectRef>
+          <a:fontRef idx="minor">
+            <a:schemeClr val="tx1"/>
+          </a:fontRef>
+        </p:style>
+      </p:cxnSp>
+      <p:sp>
+        <p:nvSpPr>
+          <p:cNvPr id="17" name="TextBox 16">
+            <a:extLst>
+              <a:ext uri="{FF2B5EF4-FFF2-40B4-BE49-F238E27FC236}">
+                <a16:creationId xmlns:a16="http://schemas.microsoft.com/office/drawing/2014/main" id="{779D13AB-8FE1-CF45-D7F9-CDCB4495DDF0}"/>
+              </a:ext>
+            </a:extLst>
+          </p:cNvPr>
+          <p:cNvSpPr txBox="1"/>
+          <p:nvPr/>
+        </p:nvSpPr>
+        <p:spPr>
+          <a:xfrm>
+            <a:off x="5484746" y="3067452"/>
+            <a:ext cx="2525435" cy="369332"/>
+          </a:xfrm>
+          <a:prstGeom prst="rect">
+            <a:avLst/>
+          </a:prstGeom>
+          <a:noFill/>
+        </p:spPr>
+        <p:txBody>
+          <a:bodyPr wrap="square" rtlCol="0">
+            <a:spAutoFit/>
+          </a:bodyPr>
+          <a:lstStyle/>
+          <a:p>
+            <a:r>
+              <a:rPr lang="en-US" dirty="0">
+                <a:latin typeface="Calibri" panose="020F0502020204030204" pitchFamily="34" charset="0"/>
+                <a:cs typeface="Calibri" panose="020F0502020204030204" pitchFamily="34" charset="0"/>
+              </a:rPr>
+              <a:t>Output 1: Population</a:t>
+            </a:r>
+          </a:p>
+        </p:txBody>
+      </p:sp>
+      <p:sp>
+        <p:nvSpPr>
+          <p:cNvPr id="21" name="TextBox 20">
+            <a:extLst>
+              <a:ext uri="{FF2B5EF4-FFF2-40B4-BE49-F238E27FC236}">
+                <a16:creationId xmlns:a16="http://schemas.microsoft.com/office/drawing/2014/main" id="{EF3D7103-FC16-020F-F039-3929A63615DE}"/>
+              </a:ext>
+            </a:extLst>
+          </p:cNvPr>
+          <p:cNvSpPr txBox="1"/>
+          <p:nvPr/>
+        </p:nvSpPr>
+        <p:spPr>
+          <a:xfrm>
+            <a:off x="5494991" y="3560095"/>
+            <a:ext cx="2525435" cy="369332"/>
+          </a:xfrm>
+          <a:prstGeom prst="rect">
+            <a:avLst/>
+          </a:prstGeom>
+          <a:noFill/>
+        </p:spPr>
+        <p:txBody>
+          <a:bodyPr wrap="square" rtlCol="0">
+            <a:spAutoFit/>
+          </a:bodyPr>
+          <a:lstStyle/>
+          <a:p>
+            <a:r>
+              <a:rPr lang="en-US" dirty="0">
+                <a:latin typeface="Calibri" panose="020F0502020204030204" pitchFamily="34" charset="0"/>
+                <a:cs typeface="Calibri" panose="020F0502020204030204" pitchFamily="34" charset="0"/>
+              </a:rPr>
+              <a:t>Output 2: Years </a:t>
+            </a:r>
+            <a:r>
+              <a:rPr lang="en-US">
+                <a:latin typeface="Calibri" panose="020F0502020204030204" pitchFamily="34" charset="0"/>
+                <a:cs typeface="Calibri" panose="020F0502020204030204" pitchFamily="34" charset="0"/>
+              </a:rPr>
+              <a:t>it take</a:t>
+            </a:r>
+            <a:endParaRPr lang="en-US" dirty="0">
+              <a:latin typeface="Calibri" panose="020F0502020204030204" pitchFamily="34" charset="0"/>
+              <a:cs typeface="Calibri" panose="020F0502020204030204" pitchFamily="34" charset="0"/>
+            </a:endParaRPr>
+          </a:p>
+        </p:txBody>
+      </p:sp>
     </p:spTree>
     <p:extLst>
       <p:ext uri="{BB962C8B-B14F-4D97-AF65-F5344CB8AC3E}">

</xml_diff>